<commit_message>
Update slides for 2016
</commit_message>
<xml_diff>
--- a/pyfrc.pptx
+++ b/pyfrc.pptx
@@ -5,7 +5,7 @@
     <p:sldMasterId id="2147483648" r:id="rId1"/>
   </p:sldMasterIdLst>
   <p:notesMasterIdLst>
-    <p:notesMasterId r:id="rId45"/>
+    <p:notesMasterId r:id="rId46"/>
   </p:notesMasterIdLst>
   <p:sldIdLst>
     <p:sldId id="256" r:id="rId2"/>
@@ -49,8 +49,9 @@
     <p:sldId id="268" r:id="rId40"/>
     <p:sldId id="266" r:id="rId41"/>
     <p:sldId id="267" r:id="rId42"/>
-    <p:sldId id="260" r:id="rId43"/>
-    <p:sldId id="258" r:id="rId44"/>
+    <p:sldId id="308" r:id="rId43"/>
+    <p:sldId id="260" r:id="rId44"/>
+    <p:sldId id="258" r:id="rId45"/>
   </p:sldIdLst>
   <p:sldSz cx="9144000" cy="6858000" type="screen4x3"/>
   <p:notesSz cx="6858000" cy="9144000"/>
@@ -234,7 +235,7 @@
           <a:p>
             <a:fld id="{E59F1345-7B83-3F40-BB81-46EE4F819762}" type="datetimeFigureOut">
               <a:rPr lang="en-US" smtClean="0"/>
-              <a:t>1/8/16</a:t>
+              <a:t>9/10/16</a:t>
             </a:fld>
             <a:endParaRPr lang="en-US"/>
           </a:p>
@@ -767,7 +768,7 @@
           <a:p>
             <a:fld id="{D535EA7C-FD01-9142-BA29-0F93DE6D4157}" type="datetimeFigureOut">
               <a:rPr lang="en-US" smtClean="0"/>
-              <a:t>1/8/16</a:t>
+              <a:t>9/10/16</a:t>
             </a:fld>
             <a:endParaRPr lang="en-US"/>
           </a:p>
@@ -937,7 +938,7 @@
           <a:p>
             <a:fld id="{D535EA7C-FD01-9142-BA29-0F93DE6D4157}" type="datetimeFigureOut">
               <a:rPr lang="en-US" smtClean="0"/>
-              <a:t>1/8/16</a:t>
+              <a:t>9/10/16</a:t>
             </a:fld>
             <a:endParaRPr lang="en-US"/>
           </a:p>
@@ -1117,7 +1118,7 @@
           <a:p>
             <a:fld id="{D535EA7C-FD01-9142-BA29-0F93DE6D4157}" type="datetimeFigureOut">
               <a:rPr lang="en-US" smtClean="0"/>
-              <a:t>1/8/16</a:t>
+              <a:t>9/10/16</a:t>
             </a:fld>
             <a:endParaRPr lang="en-US"/>
           </a:p>
@@ -1296,7 +1297,7 @@
           <a:p>
             <a:fld id="{D535EA7C-FD01-9142-BA29-0F93DE6D4157}" type="datetimeFigureOut">
               <a:rPr lang="en-US" smtClean="0"/>
-              <a:t>1/8/16</a:t>
+              <a:t>9/10/16</a:t>
             </a:fld>
             <a:endParaRPr lang="en-US"/>
           </a:p>
@@ -1616,7 +1617,7 @@
           <a:p>
             <a:fld id="{D535EA7C-FD01-9142-BA29-0F93DE6D4157}" type="datetimeFigureOut">
               <a:rPr lang="en-US" smtClean="0"/>
-              <a:t>1/8/16</a:t>
+              <a:t>9/10/16</a:t>
             </a:fld>
             <a:endParaRPr lang="en-US"/>
           </a:p>
@@ -1913,7 +1914,7 @@
           <a:p>
             <a:fld id="{D535EA7C-FD01-9142-BA29-0F93DE6D4157}" type="datetimeFigureOut">
               <a:rPr lang="en-US" smtClean="0"/>
-              <a:t>1/8/16</a:t>
+              <a:t>9/10/16</a:t>
             </a:fld>
             <a:endParaRPr lang="en-US"/>
           </a:p>
@@ -2414,7 +2415,7 @@
           <a:p>
             <a:fld id="{D535EA7C-FD01-9142-BA29-0F93DE6D4157}" type="datetimeFigureOut">
               <a:rPr lang="en-US" smtClean="0"/>
-              <a:t>1/8/16</a:t>
+              <a:t>9/10/16</a:t>
             </a:fld>
             <a:endParaRPr lang="en-US"/>
           </a:p>
@@ -2615,7 +2616,7 @@
           <a:p>
             <a:fld id="{D535EA7C-FD01-9142-BA29-0F93DE6D4157}" type="datetimeFigureOut">
               <a:rPr lang="en-US" smtClean="0"/>
-              <a:t>1/8/16</a:t>
+              <a:t>9/10/16</a:t>
             </a:fld>
             <a:endParaRPr lang="en-US"/>
           </a:p>
@@ -2784,7 +2785,7 @@
           <a:p>
             <a:fld id="{D535EA7C-FD01-9142-BA29-0F93DE6D4157}" type="datetimeFigureOut">
               <a:rPr lang="en-US" smtClean="0"/>
-              <a:t>1/8/16</a:t>
+              <a:t>9/10/16</a:t>
             </a:fld>
             <a:endParaRPr lang="en-US"/>
           </a:p>
@@ -3061,7 +3062,7 @@
           <a:p>
             <a:fld id="{D535EA7C-FD01-9142-BA29-0F93DE6D4157}" type="datetimeFigureOut">
               <a:rPr lang="en-US" smtClean="0"/>
-              <a:t>1/8/16</a:t>
+              <a:t>9/10/16</a:t>
             </a:fld>
             <a:endParaRPr lang="en-US"/>
           </a:p>
@@ -3314,7 +3315,7 @@
           <a:p>
             <a:fld id="{D535EA7C-FD01-9142-BA29-0F93DE6D4157}" type="datetimeFigureOut">
               <a:rPr lang="en-US" smtClean="0"/>
-              <a:t>1/8/16</a:t>
+              <a:t>9/10/16</a:t>
             </a:fld>
             <a:endParaRPr lang="en-US"/>
           </a:p>
@@ -3527,7 +3528,7 @@
           <a:p>
             <a:fld id="{D535EA7C-FD01-9142-BA29-0F93DE6D4157}" type="datetimeFigureOut">
               <a:rPr lang="en-US" smtClean="0"/>
-              <a:t>1/8/16</a:t>
+              <a:t>9/10/16</a:t>
             </a:fld>
             <a:endParaRPr lang="en-US"/>
           </a:p>
@@ -3961,13 +3962,13 @@
           <a:p>
             <a:r>
               <a:rPr lang="en-US" dirty="0" smtClean="0"/>
-              <a:t>Dustin Spicuzza (Team 2423)</a:t>
-            </a:r>
-          </a:p>
-          <a:p>
-            <a:r>
-              <a:rPr lang="en-US" dirty="0" smtClean="0"/>
-              <a:t>January 9, 2015</a:t>
+              <a:t>Dustin Spicuzza </a:t>
+            </a:r>
+          </a:p>
+          <a:p>
+            <a:r>
+              <a:rPr lang="en-US" dirty="0" smtClean="0"/>
+              <a:t>September 10, 2016</a:t>
             </a:r>
           </a:p>
           <a:p>
@@ -3976,11 +3977,7 @@
           <a:p>
             <a:r>
               <a:rPr lang="en-US" dirty="0" smtClean="0"/>
-              <a:t>NEU Kickoff </a:t>
-            </a:r>
-            <a:r>
-              <a:rPr lang="en-US" dirty="0" smtClean="0"/>
-              <a:t>Seminar</a:t>
+              <a:t>NE FIRST University Day</a:t>
             </a:r>
             <a:endParaRPr lang="en-US" dirty="0"/>
           </a:p>
@@ -4325,11 +4322,7 @@
           <a:p>
             <a:r>
               <a:rPr lang="en-US" dirty="0" smtClean="0"/>
-              <a:t>Robot </a:t>
-            </a:r>
-            <a:r>
-              <a:rPr lang="en-US" dirty="0" smtClean="0"/>
-              <a:t>code is written in python</a:t>
+              <a:t>Robot code is written in python</a:t>
             </a:r>
           </a:p>
           <a:p>
@@ -6522,7 +6515,6 @@
               <a:rPr lang="en-US" dirty="0" smtClean="0"/>
               <a:t>Quick Simulation Demo</a:t>
             </a:r>
-            <a:endParaRPr lang="en-US" dirty="0" smtClean="0"/>
           </a:p>
           <a:p>
             <a:r>
@@ -6533,27 +6525,8 @@
           <a:p>
             <a:r>
               <a:rPr lang="en-US" dirty="0" smtClean="0"/>
-              <a:t>Putting it all </a:t>
-            </a:r>
-            <a:r>
-              <a:rPr lang="en-US" dirty="0" smtClean="0"/>
-              <a:t>together</a:t>
-            </a:r>
-          </a:p>
-          <a:p>
-            <a:pPr lvl="1"/>
-            <a:r>
-              <a:rPr lang="en-US" dirty="0" smtClean="0"/>
-              <a:t>Robot code</a:t>
-            </a:r>
-          </a:p>
-          <a:p>
-            <a:pPr lvl="1"/>
-            <a:r>
-              <a:rPr lang="en-US" dirty="0" smtClean="0"/>
-              <a:t>Encoder demo</a:t>
-            </a:r>
-            <a:endParaRPr lang="en-US" dirty="0" smtClean="0"/>
+              <a:t>Putting it all together</a:t>
+            </a:r>
           </a:p>
           <a:p>
             <a:r>
@@ -9167,10 +9140,6 @@
                         </a:rPr>
                         <a:t>)</a:t>
                       </a:r>
-                      <a:endParaRPr lang="en-US" sz="2400" baseline="0" dirty="0" smtClean="0">
-                        <a:latin typeface="Consolas"/>
-                        <a:cs typeface="Consolas"/>
-                      </a:endParaRPr>
                     </a:p>
                   </a:txBody>
                   <a:tcPr>
@@ -9271,15 +9240,7 @@
           <a:p>
             <a:r>
               <a:rPr lang="en-US" dirty="0" smtClean="0"/>
-              <a:t>Real Robot </a:t>
-            </a:r>
-            <a:r>
-              <a:rPr lang="en-US" dirty="0" smtClean="0"/>
-              <a:t>Code: Running </a:t>
-            </a:r>
-            <a:r>
-              <a:rPr lang="en-US" dirty="0" smtClean="0"/>
-              <a:t>it</a:t>
+              <a:t>Real Robot Code: Running it</a:t>
             </a:r>
             <a:endParaRPr lang="en-US" dirty="0"/>
           </a:p>
@@ -9657,7 +9618,7 @@
                 <a:latin typeface="Roboto Black"/>
                 <a:cs typeface="Roboto Black"/>
               </a:rPr>
-              <a:t>ENCODER DEMO</a:t>
+              <a:t>DEMO</a:t>
             </a:r>
             <a:endParaRPr lang="en-US" b="0" dirty="0">
               <a:latin typeface="Roboto Black"/>
@@ -9736,7 +9697,7 @@
           <a:p>
             <a:r>
               <a:rPr lang="en-US" dirty="0" smtClean="0"/>
-              <a:t>Encoder Demo</a:t>
+              <a:t>Demo</a:t>
             </a:r>
             <a:endParaRPr lang="en-US" dirty="0"/>
           </a:p>
@@ -9838,7 +9799,7 @@
           <a:p>
             <a:r>
               <a:rPr lang="en-US" dirty="0" smtClean="0"/>
-              <a:t>Encoder Demo</a:t>
+              <a:t>Demo</a:t>
             </a:r>
             <a:endParaRPr lang="en-US" dirty="0"/>
           </a:p>
@@ -9870,7 +9831,6 @@
               <a:rPr lang="en-US" dirty="0" smtClean="0"/>
               <a:t>This is the robot code that does the work</a:t>
             </a:r>
-            <a:endParaRPr lang="en-US" dirty="0" smtClean="0"/>
           </a:p>
         </p:txBody>
       </p:sp>
@@ -9883,7 +9843,7 @@
           <p:nvPr>
             <p:extLst>
               <p:ext uri="{D42A27DB-BD31-4B8C-83A1-F6EECF244321}">
-                <p14:modId xmlns:p14="http://schemas.microsoft.com/office/powerpoint/2010/main" val="3948227815"/>
+                <p14:modId xmlns:p14="http://schemas.microsoft.com/office/powerpoint/2010/main" val="3087488212"/>
               </p:ext>
             </p:extLst>
           </p:nvPr>
@@ -9959,7 +9919,7 @@
                           <a:latin typeface="Consolas"/>
                           <a:cs typeface="Consolas"/>
                         </a:rPr>
-                        <a:t>(0)</a:t>
+                        <a:t>(2)</a:t>
                       </a:r>
                     </a:p>
                     <a:p>
@@ -10006,10 +9966,6 @@
                         </a:rPr>
                         <a:t>())</a:t>
                       </a:r>
-                      <a:endParaRPr lang="en-US" sz="2400" baseline="0" dirty="0" smtClean="0">
-                        <a:latin typeface="Consolas"/>
-                        <a:cs typeface="Consolas"/>
-                      </a:endParaRPr>
                     </a:p>
                   </a:txBody>
                   <a:tcPr>
@@ -10108,7 +10064,7 @@
           <a:p>
             <a:r>
               <a:rPr lang="en-US" dirty="0" smtClean="0"/>
-              <a:t>Encoder demo</a:t>
+              <a:t>Demo</a:t>
             </a:r>
             <a:endParaRPr lang="en-US" dirty="0"/>
           </a:p>
@@ -10151,7 +10107,6 @@
               <a:rPr lang="en-US" dirty="0" smtClean="0"/>
               <a:t> to interact with pynetworktables2js</a:t>
             </a:r>
-            <a:endParaRPr lang="en-US" dirty="0" smtClean="0"/>
           </a:p>
         </p:txBody>
       </p:sp>
@@ -10371,10 +10326,6 @@
                         </a:rPr>
                         <a:t>}</a:t>
                       </a:r>
-                      <a:endParaRPr lang="en-US" sz="2400" baseline="0" dirty="0" smtClean="0">
-                        <a:latin typeface="Consolas"/>
-                        <a:cs typeface="Consolas"/>
-                      </a:endParaRPr>
                     </a:p>
                   </a:txBody>
                   <a:tcPr>
@@ -10579,29 +10530,20 @@
             <a:pPr lvl="1"/>
             <a:r>
               <a:rPr lang="en-US" dirty="0" smtClean="0"/>
-              <a:t>Allows you to adjust various robot objects on the fly to make the simulation more </a:t>
-            </a:r>
-            <a:r>
-              <a:rPr lang="en-US" dirty="0" smtClean="0"/>
-              <a:t>useful</a:t>
-            </a:r>
-            <a:endParaRPr lang="en-US" dirty="0" smtClean="0"/>
+              <a:t>Allows you to adjust various robot objects on the fly to make the simulation more useful</a:t>
+            </a:r>
           </a:p>
           <a:p>
             <a:pPr lvl="1"/>
             <a:r>
               <a:rPr lang="en-US" dirty="0" smtClean="0"/>
-              <a:t>There might be a web-based simulator in 2016</a:t>
-            </a:r>
-          </a:p>
-          <a:p>
-            <a:r>
-              <a:rPr lang="en-US" dirty="0" smtClean="0"/>
-              <a:t>There </a:t>
-            </a:r>
-            <a:r>
-              <a:rPr lang="en-US" dirty="0" smtClean="0"/>
-              <a:t>are more pyfrc samples on </a:t>
+              <a:t>There might be a web-based simulator in 2017</a:t>
+            </a:r>
+          </a:p>
+          <a:p>
+            <a:r>
+              <a:rPr lang="en-US" dirty="0" smtClean="0"/>
+              <a:t>There are more pyfrc samples on </a:t>
             </a:r>
             <a:r>
               <a:rPr lang="en-US" dirty="0" err="1" smtClean="0"/>
@@ -10825,7 +10767,31 @@
                   <a:srgbClr val="0000FF"/>
                 </a:solidFill>
               </a:rPr>
-              <a:t>http://robotpy.readthedocs.org/en/latest/guide/</a:t>
+              <a:t>http://</a:t>
+            </a:r>
+            <a:r>
+              <a:rPr lang="en-US" u="sng" dirty="0" err="1" smtClean="0">
+                <a:solidFill>
+                  <a:srgbClr val="0000FF"/>
+                </a:solidFill>
+              </a:rPr>
+              <a:t>robotpy.readthedocs.io</a:t>
+            </a:r>
+            <a:r>
+              <a:rPr lang="en-US" u="sng" dirty="0" smtClean="0">
+                <a:solidFill>
+                  <a:srgbClr val="0000FF"/>
+                </a:solidFill>
+              </a:rPr>
+              <a:t>/</a:t>
+            </a:r>
+            <a:r>
+              <a:rPr lang="en-US" u="sng" dirty="0">
+                <a:solidFill>
+                  <a:srgbClr val="0000FF"/>
+                </a:solidFill>
+              </a:rPr>
+              <a:t>en/latest/guide/</a:t>
             </a:r>
             <a:r>
               <a:rPr lang="en-US" u="sng" dirty="0" smtClean="0">
@@ -11016,7 +10982,19 @@
               <a:rPr lang="en-US" dirty="0" smtClean="0">
                 <a:hlinkClick r:id="rId4"/>
               </a:rPr>
-              <a:t>https://docs.python.org/3.4/tutorial/</a:t>
+              <a:t>https://docs.python.org/</a:t>
+            </a:r>
+            <a:r>
+              <a:rPr lang="en-US" dirty="0" smtClean="0">
+                <a:hlinkClick r:id="rId4"/>
+              </a:rPr>
+              <a:t>3.5/</a:t>
+            </a:r>
+            <a:r>
+              <a:rPr lang="en-US" dirty="0" smtClean="0">
+                <a:hlinkClick r:id="rId4"/>
+              </a:rPr>
+              <a:t>tutorial/</a:t>
             </a:r>
             <a:endParaRPr lang="en-US" dirty="0" smtClean="0"/>
           </a:p>
@@ -11088,7 +11066,7 @@
         <p:spPr/>
         <p:txBody>
           <a:bodyPr>
-            <a:normAutofit fontScale="92500" lnSpcReduction="10000"/>
+            <a:normAutofit fontScale="92500" lnSpcReduction="20000"/>
           </a:bodyPr>
           <a:lstStyle/>
           <a:p>
@@ -11158,9 +11136,12 @@
             </a:r>
             <a:r>
               <a:rPr lang="en-US" dirty="0"/>
-              <a:t>Virginia Regional; Innovation in Control</a:t>
-            </a:r>
-            <a:endParaRPr lang="en-US" dirty="0" smtClean="0"/>
+              <a:t>Virginia Regional; </a:t>
+            </a:r>
+            <a:r>
+              <a:rPr lang="en-US" dirty="0" smtClean="0"/>
+              <a:t>Industrial Design</a:t>
+            </a:r>
           </a:p>
           <a:p>
             <a:pPr lvl="1"/>
@@ -11170,9 +11151,19 @@
             </a:r>
             <a:r>
               <a:rPr lang="en-US" dirty="0"/>
-              <a:t>; Innovation in Control</a:t>
-            </a:r>
-            <a:endParaRPr lang="en-US" dirty="0" smtClean="0"/>
+              <a:t>; Innovation in </a:t>
+            </a:r>
+            <a:r>
+              <a:rPr lang="en-US" dirty="0" smtClean="0"/>
+              <a:t>Control</a:t>
+            </a:r>
+          </a:p>
+          <a:p>
+            <a:pPr lvl="1"/>
+            <a:r>
+              <a:rPr lang="en-US" dirty="0" smtClean="0"/>
+              <a:t>2016 Chesapeake Champs; Innovation in Control</a:t>
+            </a:r>
           </a:p>
         </p:txBody>
       </p:sp>
@@ -11403,22 +11394,20 @@
               <a:rPr lang="en-US" dirty="0" smtClean="0">
                 <a:hlinkClick r:id="rId3"/>
               </a:rPr>
-              <a:t>http://pyfrc.readthedocs.org/</a:t>
+              <a:t>http://</a:t>
+            </a:r>
+            <a:r>
+              <a:rPr lang="en-US" smtClean="0">
+                <a:hlinkClick r:id="rId3"/>
+              </a:rPr>
+              <a:t>pyfrc.readthedocs.io/</a:t>
             </a:r>
             <a:endParaRPr lang="en-US" dirty="0" smtClean="0"/>
           </a:p>
           <a:p>
             <a:r>
               <a:rPr lang="en-US" dirty="0" smtClean="0"/>
-              <a:t>Team 1418’s </a:t>
-            </a:r>
-            <a:r>
-              <a:rPr lang="en-US" dirty="0" smtClean="0"/>
-              <a:t>2015 </a:t>
-            </a:r>
-            <a:r>
-              <a:rPr lang="en-US" dirty="0" smtClean="0"/>
-              <a:t>code</a:t>
+              <a:t>Team 1418’s 2015 code</a:t>
             </a:r>
           </a:p>
           <a:p>
@@ -11427,13 +11416,7 @@
               <a:rPr lang="en-US" dirty="0" smtClean="0">
                 <a:hlinkClick r:id="rId4"/>
               </a:rPr>
-              <a:t>https://github.com/frc1418/</a:t>
-            </a:r>
-            <a:r>
-              <a:rPr lang="en-US" dirty="0" smtClean="0">
-                <a:hlinkClick r:id="rId4"/>
-              </a:rPr>
-              <a:t>2015</a:t>
+              <a:t>https://github.com/frc1418/2015</a:t>
             </a:r>
             <a:endParaRPr lang="en-US" dirty="0" smtClean="0"/>
           </a:p>
@@ -11490,6 +11473,196 @@
           <a:p>
             <a:r>
               <a:rPr lang="en-US" dirty="0" smtClean="0"/>
+              <a:t>One more thing</a:t>
+            </a:r>
+            <a:r>
+              <a:rPr lang="is-IS" dirty="0" smtClean="0"/>
+              <a:t>…</a:t>
+            </a:r>
+            <a:endParaRPr lang="en-US" dirty="0"/>
+          </a:p>
+        </p:txBody>
+      </p:sp>
+      <p:sp>
+        <p:nvSpPr>
+          <p:cNvPr id="4" name="Content Placeholder 3"/>
+          <p:cNvSpPr>
+            <a:spLocks noGrp="1"/>
+          </p:cNvSpPr>
+          <p:nvPr>
+            <p:ph sz="half" idx="1"/>
+          </p:nvPr>
+        </p:nvSpPr>
+        <p:spPr/>
+        <p:txBody>
+          <a:bodyPr/>
+          <a:lstStyle/>
+          <a:p>
+            <a:r>
+              <a:rPr lang="en-US" dirty="0"/>
+              <a:t>Publicly editable </a:t>
+            </a:r>
+            <a:r>
+              <a:rPr lang="en-US" dirty="0" smtClean="0"/>
+              <a:t>repository </a:t>
+            </a:r>
+            <a:r>
+              <a:rPr lang="en-US" dirty="0"/>
+              <a:t>of information related to FIRST </a:t>
+            </a:r>
+            <a:r>
+              <a:rPr lang="en-US" dirty="0" smtClean="0"/>
+              <a:t>Robotics</a:t>
+            </a:r>
+          </a:p>
+          <a:p>
+            <a:pPr lvl="1"/>
+            <a:r>
+              <a:rPr lang="en-US" dirty="0" smtClean="0"/>
+              <a:t>Technical topics</a:t>
+            </a:r>
+          </a:p>
+          <a:p>
+            <a:pPr lvl="1"/>
+            <a:r>
+              <a:rPr lang="en-US" dirty="0" smtClean="0"/>
+              <a:t>Non-technical</a:t>
+            </a:r>
+          </a:p>
+          <a:p>
+            <a:pPr lvl="1"/>
+            <a:r>
+              <a:rPr lang="en-US" dirty="0" smtClean="0"/>
+              <a:t>Team pages</a:t>
+            </a:r>
+          </a:p>
+          <a:p>
+            <a:r>
+              <a:rPr lang="en-US" dirty="0" smtClean="0"/>
+              <a:t>Add content to your team’s page!</a:t>
+            </a:r>
+          </a:p>
+          <a:p>
+            <a:endParaRPr lang="en-US" dirty="0"/>
+          </a:p>
+          <a:p>
+            <a:endParaRPr lang="en-US" dirty="0"/>
+          </a:p>
+          <a:p>
+            <a:endParaRPr lang="en-US" dirty="0"/>
+          </a:p>
+        </p:txBody>
+      </p:sp>
+      <p:pic>
+        <p:nvPicPr>
+          <p:cNvPr id="6" name="Picture 5" descr="logo.png"/>
+          <p:cNvPicPr>
+            <a:picLocks noChangeAspect="1"/>
+          </p:cNvPicPr>
+          <p:nvPr/>
+        </p:nvPicPr>
+        <p:blipFill>
+          <a:blip r:embed="rId2">
+            <a:extLst>
+              <a:ext uri="{28A0092B-C50C-407E-A947-70E740481C1C}">
+                <a14:useLocalDpi xmlns:a14="http://schemas.microsoft.com/office/drawing/2010/main" val="0"/>
+              </a:ext>
+            </a:extLst>
+          </a:blip>
+          <a:stretch>
+            <a:fillRect/>
+          </a:stretch>
+        </p:blipFill>
+        <p:spPr>
+          <a:xfrm>
+            <a:off x="4495800" y="1602973"/>
+            <a:ext cx="3561649" cy="3561649"/>
+          </a:xfrm>
+          <a:prstGeom prst="rect">
+            <a:avLst/>
+          </a:prstGeom>
+        </p:spPr>
+      </p:pic>
+      <p:sp>
+        <p:nvSpPr>
+          <p:cNvPr id="7" name="Rectangle 6"/>
+          <p:cNvSpPr/>
+          <p:nvPr/>
+        </p:nvSpPr>
+        <p:spPr>
+          <a:xfrm>
+            <a:off x="4571999" y="5313639"/>
+            <a:ext cx="4295574" cy="523220"/>
+          </a:xfrm>
+          <a:prstGeom prst="rect">
+            <a:avLst/>
+          </a:prstGeom>
+        </p:spPr>
+        <p:txBody>
+          <a:bodyPr wrap="square">
+            <a:spAutoFit/>
+          </a:bodyPr>
+          <a:lstStyle/>
+          <a:p>
+            <a:r>
+              <a:rPr lang="en-US" sz="2800" dirty="0" smtClean="0"/>
+              <a:t>https://</a:t>
+            </a:r>
+            <a:r>
+              <a:rPr lang="en-US" sz="2800" dirty="0" err="1" smtClean="0"/>
+              <a:t>firstwiki.github.io</a:t>
+            </a:r>
+            <a:endParaRPr lang="en-US" sz="2800" dirty="0"/>
+          </a:p>
+        </p:txBody>
+      </p:sp>
+    </p:spTree>
+    <p:extLst>
+      <p:ext uri="{BB962C8B-B14F-4D97-AF65-F5344CB8AC3E}">
+        <p14:creationId xmlns:p14="http://schemas.microsoft.com/office/powerpoint/2010/main" val="538560291"/>
+      </p:ext>
+    </p:extLst>
+  </p:cSld>
+  <p:clrMapOvr>
+    <a:masterClrMapping/>
+  </p:clrMapOvr>
+</p:sld>
+</file>
+
+<file path=ppt/slides/slide43.xml><?xml version="1.0" encoding="utf-8"?>
+<p:sld xmlns:a="http://schemas.openxmlformats.org/drawingml/2006/main" xmlns:r="http://schemas.openxmlformats.org/officeDocument/2006/relationships" xmlns:p="http://schemas.openxmlformats.org/presentationml/2006/main">
+  <p:cSld>
+    <p:spTree>
+      <p:nvGrpSpPr>
+        <p:cNvPr id="1" name=""/>
+        <p:cNvGrpSpPr/>
+        <p:nvPr/>
+      </p:nvGrpSpPr>
+      <p:grpSpPr>
+        <a:xfrm>
+          <a:off x="0" y="0"/>
+          <a:ext cx="0" cy="0"/>
+          <a:chOff x="0" y="0"/>
+          <a:chExt cx="0" cy="0"/>
+        </a:xfrm>
+      </p:grpSpPr>
+      <p:sp>
+        <p:nvSpPr>
+          <p:cNvPr id="2" name="Title 1"/>
+          <p:cNvSpPr>
+            <a:spLocks noGrp="1"/>
+          </p:cNvSpPr>
+          <p:nvPr>
+            <p:ph type="title"/>
+          </p:nvPr>
+        </p:nvSpPr>
+        <p:spPr/>
+        <p:txBody>
+          <a:bodyPr/>
+          <a:lstStyle/>
+          <a:p>
+            <a:r>
+              <a:rPr lang="en-US" dirty="0" smtClean="0"/>
               <a:t>Questions</a:t>
             </a:r>
             <a:endParaRPr lang="en-US" dirty="0"/>
@@ -11539,7 +11712,7 @@
 </p:sld>
 </file>
 
-<file path=ppt/slides/slide43.xml><?xml version="1.0" encoding="utf-8"?>
+<file path=ppt/slides/slide44.xml><?xml version="1.0" encoding="utf-8"?>
 <p:sld xmlns:a="http://schemas.openxmlformats.org/drawingml/2006/main" xmlns:r="http://schemas.openxmlformats.org/officeDocument/2006/relationships" xmlns:p="http://schemas.openxmlformats.org/presentationml/2006/main">
   <p:cSld>
     <p:spTree>
@@ -12012,7 +12185,7 @@
             </a:r>
             <a:r>
               <a:rPr lang="en-US" dirty="0" smtClean="0"/>
-              <a:t>? They don’t respond quickly.</a:t>
+              <a:t>? They don’t respond quickly*</a:t>
             </a:r>
           </a:p>
           <a:p>
@@ -12231,6 +12404,13 @@
             </a:r>
           </a:p>
           <a:p>
+            <a:pPr lvl="1"/>
+            <a:r>
+              <a:rPr lang="en-US" dirty="0" smtClean="0"/>
+              <a:t>33 teams used Python in 2016</a:t>
+            </a:r>
+          </a:p>
+          <a:p>
             <a:r>
               <a:rPr lang="en-US" dirty="0" smtClean="0"/>
               <a:t>Support at competitions is low</a:t>
@@ -12264,17 +12444,6 @@
             <a:r>
               <a:rPr lang="en-US" dirty="0" smtClean="0"/>
               <a:t> problems, not python problems</a:t>
-            </a:r>
-          </a:p>
-          <a:p>
-            <a:pPr lvl="1"/>
-            <a:r>
-              <a:rPr lang="en-US" dirty="0"/>
-              <a:t>I’ll be CSA at Reading and Boston district </a:t>
-            </a:r>
-            <a:r>
-              <a:rPr lang="en-US" dirty="0" smtClean="0"/>
-              <a:t>events</a:t>
             </a:r>
             <a:endParaRPr lang="en-US" dirty="0"/>
           </a:p>

</xml_diff>